<commit_message>
Updated digram of deployment pipeline
</commit_message>
<xml_diff>
--- a/ShortReport.pptx
+++ b/ShortReport.pptx
@@ -7,8 +7,10 @@
   <p:sldIdLst>
     <p:sldId id="256" r:id="rId2"/>
     <p:sldId id="258" r:id="rId3"/>
-    <p:sldId id="257" r:id="rId4"/>
-    <p:sldId id="259" r:id="rId5"/>
+    <p:sldId id="260" r:id="rId4"/>
+    <p:sldId id="257" r:id="rId5"/>
+    <p:sldId id="259" r:id="rId6"/>
+    <p:sldId id="261" r:id="rId7"/>
   </p:sldIdLst>
   <p:sldSz cx="12192000" cy="6858000"/>
   <p:notesSz cx="6858000" cy="9144000"/>
@@ -837,7 +839,7 @@
           <a:p>
             <a:fld id="{9DA34602-64CD-4804-BE1C-8026EE467431}" type="datetimeFigureOut">
               <a:rPr lang="en-IN" smtClean="0"/>
-              <a:t>19-10-2022</a:t>
+              <a:t>07-11-2022</a:t>
             </a:fld>
             <a:endParaRPr lang="en-IN"/>
           </a:p>
@@ -1088,7 +1090,7 @@
           <a:p>
             <a:fld id="{9DA34602-64CD-4804-BE1C-8026EE467431}" type="datetimeFigureOut">
               <a:rPr lang="en-IN" smtClean="0"/>
-              <a:t>19-10-2022</a:t>
+              <a:t>07-11-2022</a:t>
             </a:fld>
             <a:endParaRPr lang="en-IN"/>
           </a:p>
@@ -1402,7 +1404,7 @@
           <a:p>
             <a:fld id="{9DA34602-64CD-4804-BE1C-8026EE467431}" type="datetimeFigureOut">
               <a:rPr lang="en-IN" smtClean="0"/>
-              <a:t>19-10-2022</a:t>
+              <a:t>07-11-2022</a:t>
             </a:fld>
             <a:endParaRPr lang="en-IN"/>
           </a:p>
@@ -1743,7 +1745,7 @@
           <a:p>
             <a:fld id="{9DA34602-64CD-4804-BE1C-8026EE467431}" type="datetimeFigureOut">
               <a:rPr lang="en-IN" smtClean="0"/>
-              <a:t>19-10-2022</a:t>
+              <a:t>07-11-2022</a:t>
             </a:fld>
             <a:endParaRPr lang="en-IN"/>
           </a:p>
@@ -2057,7 +2059,7 @@
           <a:p>
             <a:fld id="{9DA34602-64CD-4804-BE1C-8026EE467431}" type="datetimeFigureOut">
               <a:rPr lang="en-IN" smtClean="0"/>
-              <a:t>19-10-2022</a:t>
+              <a:t>07-11-2022</a:t>
             </a:fld>
             <a:endParaRPr lang="en-IN"/>
           </a:p>
@@ -2450,7 +2452,7 @@
           <a:p>
             <a:fld id="{9DA34602-64CD-4804-BE1C-8026EE467431}" type="datetimeFigureOut">
               <a:rPr lang="en-IN" smtClean="0"/>
-              <a:t>19-10-2022</a:t>
+              <a:t>07-11-2022</a:t>
             </a:fld>
             <a:endParaRPr lang="en-IN"/>
           </a:p>
@@ -2620,7 +2622,7 @@
           <a:p>
             <a:fld id="{9DA34602-64CD-4804-BE1C-8026EE467431}" type="datetimeFigureOut">
               <a:rPr lang="en-IN" smtClean="0"/>
-              <a:t>19-10-2022</a:t>
+              <a:t>07-11-2022</a:t>
             </a:fld>
             <a:endParaRPr lang="en-IN"/>
           </a:p>
@@ -2800,7 +2802,7 @@
           <a:p>
             <a:fld id="{9DA34602-64CD-4804-BE1C-8026EE467431}" type="datetimeFigureOut">
               <a:rPr lang="en-IN" smtClean="0"/>
-              <a:t>19-10-2022</a:t>
+              <a:t>07-11-2022</a:t>
             </a:fld>
             <a:endParaRPr lang="en-IN"/>
           </a:p>
@@ -2976,7 +2978,7 @@
           <a:p>
             <a:fld id="{9DA34602-64CD-4804-BE1C-8026EE467431}" type="datetimeFigureOut">
               <a:rPr lang="en-IN" smtClean="0"/>
-              <a:t>19-10-2022</a:t>
+              <a:t>07-11-2022</a:t>
             </a:fld>
             <a:endParaRPr lang="en-IN"/>
           </a:p>
@@ -3223,7 +3225,7 @@
           <a:p>
             <a:fld id="{9DA34602-64CD-4804-BE1C-8026EE467431}" type="datetimeFigureOut">
               <a:rPr lang="en-IN" smtClean="0"/>
-              <a:t>19-10-2022</a:t>
+              <a:t>07-11-2022</a:t>
             </a:fld>
             <a:endParaRPr lang="en-IN"/>
           </a:p>
@@ -3455,7 +3457,7 @@
           <a:p>
             <a:fld id="{9DA34602-64CD-4804-BE1C-8026EE467431}" type="datetimeFigureOut">
               <a:rPr lang="en-IN" smtClean="0"/>
-              <a:t>19-10-2022</a:t>
+              <a:t>07-11-2022</a:t>
             </a:fld>
             <a:endParaRPr lang="en-IN"/>
           </a:p>
@@ -3829,7 +3831,7 @@
           <a:p>
             <a:fld id="{9DA34602-64CD-4804-BE1C-8026EE467431}" type="datetimeFigureOut">
               <a:rPr lang="en-IN" smtClean="0"/>
-              <a:t>19-10-2022</a:t>
+              <a:t>07-11-2022</a:t>
             </a:fld>
             <a:endParaRPr lang="en-IN"/>
           </a:p>
@@ -3952,7 +3954,7 @@
           <a:p>
             <a:fld id="{9DA34602-64CD-4804-BE1C-8026EE467431}" type="datetimeFigureOut">
               <a:rPr lang="en-IN" smtClean="0"/>
-              <a:t>19-10-2022</a:t>
+              <a:t>07-11-2022</a:t>
             </a:fld>
             <a:endParaRPr lang="en-IN"/>
           </a:p>
@@ -4047,7 +4049,7 @@
           <a:p>
             <a:fld id="{9DA34602-64CD-4804-BE1C-8026EE467431}" type="datetimeFigureOut">
               <a:rPr lang="en-IN" smtClean="0"/>
-              <a:t>19-10-2022</a:t>
+              <a:t>07-11-2022</a:t>
             </a:fld>
             <a:endParaRPr lang="en-IN"/>
           </a:p>
@@ -4302,7 +4304,7 @@
           <a:p>
             <a:fld id="{9DA34602-64CD-4804-BE1C-8026EE467431}" type="datetimeFigureOut">
               <a:rPr lang="en-IN" smtClean="0"/>
-              <a:t>19-10-2022</a:t>
+              <a:t>07-11-2022</a:t>
             </a:fld>
             <a:endParaRPr lang="en-IN"/>
           </a:p>
@@ -4565,7 +4567,7 @@
           <a:p>
             <a:fld id="{9DA34602-64CD-4804-BE1C-8026EE467431}" type="datetimeFigureOut">
               <a:rPr lang="en-IN" smtClean="0"/>
-              <a:t>19-10-2022</a:t>
+              <a:t>07-11-2022</a:t>
             </a:fld>
             <a:endParaRPr lang="en-IN"/>
           </a:p>
@@ -5308,7 +5310,7 @@
           <a:p>
             <a:fld id="{9DA34602-64CD-4804-BE1C-8026EE467431}" type="datetimeFigureOut">
               <a:rPr lang="en-IN" smtClean="0"/>
-              <a:t>19-10-2022</a:t>
+              <a:t>07-11-2022</a:t>
             </a:fld>
             <a:endParaRPr lang="en-IN"/>
           </a:p>
@@ -6073,6 +6075,469 @@
           <a:chExt cx="0" cy="0"/>
         </a:xfrm>
       </p:grpSpPr>
+      <p:sp>
+        <p:nvSpPr>
+          <p:cNvPr id="2" name="Title 1">
+            <a:extLst>
+              <a:ext uri="{FF2B5EF4-FFF2-40B4-BE49-F238E27FC236}">
+                <a16:creationId xmlns:a16="http://schemas.microsoft.com/office/drawing/2014/main" id="{C87A976A-B2EB-B3D5-928D-B3EB37E9EAA8}"/>
+              </a:ext>
+            </a:extLst>
+          </p:cNvPr>
+          <p:cNvSpPr>
+            <a:spLocks noGrp="1"/>
+          </p:cNvSpPr>
+          <p:nvPr>
+            <p:ph type="title"/>
+          </p:nvPr>
+        </p:nvSpPr>
+        <p:spPr>
+          <a:xfrm>
+            <a:off x="300262" y="710802"/>
+            <a:ext cx="8596668" cy="983530"/>
+          </a:xfrm>
+        </p:spPr>
+        <p:txBody>
+          <a:bodyPr/>
+          <a:lstStyle/>
+          <a:p>
+            <a:r>
+              <a:rPr lang="en-US" b="1" dirty="0">
+                <a:solidFill>
+                  <a:srgbClr val="00B050"/>
+                </a:solidFill>
+              </a:rPr>
+              <a:t>ML Model</a:t>
+            </a:r>
+            <a:endParaRPr lang="en-IN" dirty="0"/>
+          </a:p>
+        </p:txBody>
+      </p:sp>
+      <p:sp>
+        <p:nvSpPr>
+          <p:cNvPr id="5" name="TextBox 4">
+            <a:extLst>
+              <a:ext uri="{FF2B5EF4-FFF2-40B4-BE49-F238E27FC236}">
+                <a16:creationId xmlns:a16="http://schemas.microsoft.com/office/drawing/2014/main" id="{33C4F27D-4D03-CE56-DD71-78C01CAEC652}"/>
+              </a:ext>
+            </a:extLst>
+          </p:cNvPr>
+          <p:cNvSpPr txBox="1"/>
+          <p:nvPr/>
+        </p:nvSpPr>
+        <p:spPr>
+          <a:xfrm>
+            <a:off x="373177" y="2856320"/>
+            <a:ext cx="2157963" cy="1477328"/>
+          </a:xfrm>
+          <a:prstGeom prst="rect">
+            <a:avLst/>
+          </a:prstGeom>
+          <a:noFill/>
+        </p:spPr>
+        <p:txBody>
+          <a:bodyPr wrap="none" rtlCol="0">
+            <a:spAutoFit/>
+          </a:bodyPr>
+          <a:lstStyle/>
+          <a:p>
+            <a:r>
+              <a:rPr lang="en-US" dirty="0"/>
+              <a:t>Examinations of </a:t>
+            </a:r>
+          </a:p>
+          <a:p>
+            <a:r>
+              <a:rPr lang="en-US" dirty="0"/>
+              <a:t>patients' body such</a:t>
+            </a:r>
+          </a:p>
+          <a:p>
+            <a:r>
+              <a:rPr lang="en-US" dirty="0"/>
+              <a:t>as maximum heart</a:t>
+            </a:r>
+          </a:p>
+          <a:p>
+            <a:r>
+              <a:rPr lang="en-US" dirty="0"/>
+              <a:t>rate and blood </a:t>
+            </a:r>
+          </a:p>
+          <a:p>
+            <a:r>
+              <a:rPr lang="en-US" dirty="0"/>
+              <a:t>pressure.</a:t>
+            </a:r>
+            <a:endParaRPr lang="en-IN" dirty="0"/>
+          </a:p>
+        </p:txBody>
+      </p:sp>
+      <p:sp>
+        <p:nvSpPr>
+          <p:cNvPr id="7" name="Rectangle 6">
+            <a:extLst>
+              <a:ext uri="{FF2B5EF4-FFF2-40B4-BE49-F238E27FC236}">
+                <a16:creationId xmlns:a16="http://schemas.microsoft.com/office/drawing/2014/main" id="{F29F3475-6422-1BDD-23E5-674A427D3633}"/>
+              </a:ext>
+            </a:extLst>
+          </p:cNvPr>
+          <p:cNvSpPr/>
+          <p:nvPr/>
+        </p:nvSpPr>
+        <p:spPr>
+          <a:xfrm>
+            <a:off x="3723584" y="2903455"/>
+            <a:ext cx="2658359" cy="1366887"/>
+          </a:xfrm>
+          <a:prstGeom prst="rect">
+            <a:avLst/>
+          </a:prstGeom>
+        </p:spPr>
+        <p:style>
+          <a:lnRef idx="2">
+            <a:schemeClr val="accent2">
+              <a:shade val="50000"/>
+            </a:schemeClr>
+          </a:lnRef>
+          <a:fillRef idx="1">
+            <a:schemeClr val="accent2"/>
+          </a:fillRef>
+          <a:effectRef idx="0">
+            <a:schemeClr val="accent2"/>
+          </a:effectRef>
+          <a:fontRef idx="minor">
+            <a:schemeClr val="lt1"/>
+          </a:fontRef>
+        </p:style>
+        <p:txBody>
+          <a:bodyPr rtlCol="0" anchor="ctr"/>
+          <a:lstStyle/>
+          <a:p>
+            <a:pPr algn="ctr"/>
+            <a:r>
+              <a:rPr lang="en-US" dirty="0"/>
+              <a:t>ML Model</a:t>
+            </a:r>
+            <a:endParaRPr lang="en-IN" dirty="0"/>
+          </a:p>
+        </p:txBody>
+      </p:sp>
+      <p:graphicFrame>
+        <p:nvGraphicFramePr>
+          <p:cNvPr id="8" name="Table 8">
+            <a:extLst>
+              <a:ext uri="{FF2B5EF4-FFF2-40B4-BE49-F238E27FC236}">
+                <a16:creationId xmlns:a16="http://schemas.microsoft.com/office/drawing/2014/main" id="{B445BDD3-BD36-015C-620A-955F326E4399}"/>
+              </a:ext>
+            </a:extLst>
+          </p:cNvPr>
+          <p:cNvGraphicFramePr>
+            <a:graphicFrameLocks noGrp="1"/>
+          </p:cNvGraphicFramePr>
+          <p:nvPr>
+            <p:extLst>
+              <p:ext uri="{D42A27DB-BD31-4B8C-83A1-F6EECF244321}">
+                <p14:modId xmlns:p14="http://schemas.microsoft.com/office/powerpoint/2010/main" val="3530231718"/>
+              </p:ext>
+            </p:extLst>
+          </p:nvPr>
+        </p:nvGraphicFramePr>
+        <p:xfrm>
+          <a:off x="7744073" y="3205290"/>
+          <a:ext cx="616932" cy="741680"/>
+        </p:xfrm>
+        <a:graphic>
+          <a:graphicData uri="http://schemas.openxmlformats.org/drawingml/2006/table">
+            <a:tbl>
+              <a:tblPr firstRow="1" bandRow="1">
+                <a:tableStyleId>{5C22544A-7EE6-4342-B048-85BDC9FD1C3A}</a:tableStyleId>
+              </a:tblPr>
+              <a:tblGrid>
+                <a:gridCol w="616932">
+                  <a:extLst>
+                    <a:ext uri="{9D8B030D-6E8A-4147-A177-3AD203B41FA5}">
+                      <a16:colId xmlns:a16="http://schemas.microsoft.com/office/drawing/2014/main" val="489497028"/>
+                    </a:ext>
+                  </a:extLst>
+                </a:gridCol>
+              </a:tblGrid>
+              <a:tr h="370840">
+                <a:tc>
+                  <a:txBody>
+                    <a:bodyPr/>
+                    <a:lstStyle/>
+                    <a:p>
+                      <a:r>
+                        <a:rPr lang="en-US" dirty="0"/>
+                        <a:t>YES</a:t>
+                      </a:r>
+                      <a:endParaRPr lang="en-IN" dirty="0"/>
+                    </a:p>
+                  </a:txBody>
+                  <a:tcPr/>
+                </a:tc>
+                <a:extLst>
+                  <a:ext uri="{0D108BD9-81ED-4DB2-BD59-A6C34878D82A}">
+                    <a16:rowId xmlns:a16="http://schemas.microsoft.com/office/drawing/2014/main" val="3145978738"/>
+                  </a:ext>
+                </a:extLst>
+              </a:tr>
+              <a:tr h="370840">
+                <a:tc>
+                  <a:txBody>
+                    <a:bodyPr/>
+                    <a:lstStyle/>
+                    <a:p>
+                      <a:r>
+                        <a:rPr lang="en-US" dirty="0"/>
+                        <a:t>NO</a:t>
+                      </a:r>
+                      <a:endParaRPr lang="en-IN" dirty="0"/>
+                    </a:p>
+                  </a:txBody>
+                  <a:tcPr/>
+                </a:tc>
+                <a:extLst>
+                  <a:ext uri="{0D108BD9-81ED-4DB2-BD59-A6C34878D82A}">
+                    <a16:rowId xmlns:a16="http://schemas.microsoft.com/office/drawing/2014/main" val="2481768138"/>
+                  </a:ext>
+                </a:extLst>
+              </a:tr>
+            </a:tbl>
+          </a:graphicData>
+        </a:graphic>
+      </p:graphicFrame>
+      <p:cxnSp>
+        <p:nvCxnSpPr>
+          <p:cNvPr id="10" name="Straight Arrow Connector 9">
+            <a:extLst>
+              <a:ext uri="{FF2B5EF4-FFF2-40B4-BE49-F238E27FC236}">
+                <a16:creationId xmlns:a16="http://schemas.microsoft.com/office/drawing/2014/main" id="{83898CFE-423A-CBAC-E023-0EE6260B056C}"/>
+              </a:ext>
+            </a:extLst>
+          </p:cNvPr>
+          <p:cNvCxnSpPr>
+            <a:stCxn id="5" idx="3"/>
+            <a:endCxn id="7" idx="1"/>
+          </p:cNvCxnSpPr>
+          <p:nvPr/>
+        </p:nvCxnSpPr>
+        <p:spPr>
+          <a:xfrm flipV="1">
+            <a:off x="2531140" y="3586899"/>
+            <a:ext cx="1192444" cy="8085"/>
+          </a:xfrm>
+          <a:prstGeom prst="straightConnector1">
+            <a:avLst/>
+          </a:prstGeom>
+          <a:ln>
+            <a:tailEnd type="triangle"/>
+          </a:ln>
+        </p:spPr>
+        <p:style>
+          <a:lnRef idx="1">
+            <a:schemeClr val="accent1"/>
+          </a:lnRef>
+          <a:fillRef idx="0">
+            <a:schemeClr val="accent1"/>
+          </a:fillRef>
+          <a:effectRef idx="0">
+            <a:schemeClr val="accent1"/>
+          </a:effectRef>
+          <a:fontRef idx="minor">
+            <a:schemeClr val="tx1"/>
+          </a:fontRef>
+        </p:style>
+      </p:cxnSp>
+      <p:cxnSp>
+        <p:nvCxnSpPr>
+          <p:cNvPr id="12" name="Straight Arrow Connector 11">
+            <a:extLst>
+              <a:ext uri="{FF2B5EF4-FFF2-40B4-BE49-F238E27FC236}">
+                <a16:creationId xmlns:a16="http://schemas.microsoft.com/office/drawing/2014/main" id="{11248AFB-AB45-8FB2-8676-E9ACE9A7E8BF}"/>
+              </a:ext>
+            </a:extLst>
+          </p:cNvPr>
+          <p:cNvCxnSpPr>
+            <a:stCxn id="7" idx="3"/>
+            <a:endCxn id="8" idx="1"/>
+          </p:cNvCxnSpPr>
+          <p:nvPr/>
+        </p:nvCxnSpPr>
+        <p:spPr>
+          <a:xfrm flipV="1">
+            <a:off x="6381943" y="3576130"/>
+            <a:ext cx="1362130" cy="10769"/>
+          </a:xfrm>
+          <a:prstGeom prst="straightConnector1">
+            <a:avLst/>
+          </a:prstGeom>
+          <a:ln>
+            <a:tailEnd type="triangle"/>
+          </a:ln>
+        </p:spPr>
+        <p:style>
+          <a:lnRef idx="1">
+            <a:schemeClr val="accent1"/>
+          </a:lnRef>
+          <a:fillRef idx="0">
+            <a:schemeClr val="accent1"/>
+          </a:fillRef>
+          <a:effectRef idx="0">
+            <a:schemeClr val="accent1"/>
+          </a:effectRef>
+          <a:fontRef idx="minor">
+            <a:schemeClr val="tx1"/>
+          </a:fontRef>
+        </p:style>
+      </p:cxnSp>
+      <p:sp>
+        <p:nvSpPr>
+          <p:cNvPr id="13" name="TextBox 12">
+            <a:extLst>
+              <a:ext uri="{FF2B5EF4-FFF2-40B4-BE49-F238E27FC236}">
+                <a16:creationId xmlns:a16="http://schemas.microsoft.com/office/drawing/2014/main" id="{11F4F8BA-74CF-8AC7-2026-41B0557F5ACB}"/>
+              </a:ext>
+            </a:extLst>
+          </p:cNvPr>
+          <p:cNvSpPr txBox="1"/>
+          <p:nvPr/>
+        </p:nvSpPr>
+        <p:spPr>
+          <a:xfrm>
+            <a:off x="730486" y="2486988"/>
+            <a:ext cx="747320" cy="369332"/>
+          </a:xfrm>
+          <a:prstGeom prst="rect">
+            <a:avLst/>
+          </a:prstGeom>
+          <a:noFill/>
+        </p:spPr>
+        <p:txBody>
+          <a:bodyPr wrap="none" rtlCol="0">
+            <a:spAutoFit/>
+          </a:bodyPr>
+          <a:lstStyle/>
+          <a:p>
+            <a:r>
+              <a:rPr lang="en-US" b="1" dirty="0"/>
+              <a:t>Input</a:t>
+            </a:r>
+            <a:endParaRPr lang="en-IN" b="1" dirty="0"/>
+          </a:p>
+        </p:txBody>
+      </p:sp>
+      <p:sp>
+        <p:nvSpPr>
+          <p:cNvPr id="14" name="TextBox 13">
+            <a:extLst>
+              <a:ext uri="{FF2B5EF4-FFF2-40B4-BE49-F238E27FC236}">
+                <a16:creationId xmlns:a16="http://schemas.microsoft.com/office/drawing/2014/main" id="{95E7AFC8-FD33-5BEB-4354-5DE6072EA198}"/>
+              </a:ext>
+            </a:extLst>
+          </p:cNvPr>
+          <p:cNvSpPr txBox="1"/>
+          <p:nvPr/>
+        </p:nvSpPr>
+        <p:spPr>
+          <a:xfrm>
+            <a:off x="6936312" y="2481643"/>
+            <a:ext cx="2347117" cy="646331"/>
+          </a:xfrm>
+          <a:prstGeom prst="rect">
+            <a:avLst/>
+          </a:prstGeom>
+          <a:noFill/>
+        </p:spPr>
+        <p:txBody>
+          <a:bodyPr wrap="none" rtlCol="0">
+            <a:spAutoFit/>
+          </a:bodyPr>
+          <a:lstStyle/>
+          <a:p>
+            <a:pPr algn="ctr"/>
+            <a:r>
+              <a:rPr lang="en-US" b="1" dirty="0"/>
+              <a:t>Output: </a:t>
+            </a:r>
+          </a:p>
+          <a:p>
+            <a:pPr algn="ctr"/>
+            <a:r>
+              <a:rPr lang="en-US" b="1" dirty="0"/>
+              <a:t>one of the following</a:t>
+            </a:r>
+            <a:endParaRPr lang="en-IN" b="1" dirty="0"/>
+          </a:p>
+        </p:txBody>
+      </p:sp>
+      <p:sp>
+        <p:nvSpPr>
+          <p:cNvPr id="15" name="TextBox 14">
+            <a:extLst>
+              <a:ext uri="{FF2B5EF4-FFF2-40B4-BE49-F238E27FC236}">
+                <a16:creationId xmlns:a16="http://schemas.microsoft.com/office/drawing/2014/main" id="{C93688C1-E639-7AF5-5C34-CAF1B60A37CF}"/>
+              </a:ext>
+            </a:extLst>
+          </p:cNvPr>
+          <p:cNvSpPr txBox="1"/>
+          <p:nvPr/>
+        </p:nvSpPr>
+        <p:spPr>
+          <a:xfrm>
+            <a:off x="6310411" y="4395126"/>
+            <a:ext cx="4101187" cy="369332"/>
+          </a:xfrm>
+          <a:prstGeom prst="rect">
+            <a:avLst/>
+          </a:prstGeom>
+          <a:noFill/>
+        </p:spPr>
+        <p:txBody>
+          <a:bodyPr wrap="none" rtlCol="0">
+            <a:spAutoFit/>
+          </a:bodyPr>
+          <a:lstStyle/>
+          <a:p>
+            <a:r>
+              <a:rPr lang="en-US" dirty="0"/>
+              <a:t>Predicted yes if there is heart disease</a:t>
+            </a:r>
+            <a:endParaRPr lang="en-IN" dirty="0"/>
+          </a:p>
+        </p:txBody>
+      </p:sp>
+    </p:spTree>
+    <p:extLst>
+      <p:ext uri="{BB962C8B-B14F-4D97-AF65-F5344CB8AC3E}">
+        <p14:creationId xmlns:p14="http://schemas.microsoft.com/office/powerpoint/2010/main" val="2722047759"/>
+      </p:ext>
+    </p:extLst>
+  </p:cSld>
+  <p:clrMapOvr>
+    <a:masterClrMapping/>
+  </p:clrMapOvr>
+</p:sld>
+</file>
+
+<file path=ppt/slides/slide4.xml><?xml version="1.0" encoding="utf-8"?>
+<p:sld xmlns:a="http://schemas.openxmlformats.org/drawingml/2006/main" xmlns:r="http://schemas.openxmlformats.org/officeDocument/2006/relationships" xmlns:p="http://schemas.openxmlformats.org/presentationml/2006/main">
+  <p:cSld>
+    <p:spTree>
+      <p:nvGrpSpPr>
+        <p:cNvPr id="1" name=""/>
+        <p:cNvGrpSpPr/>
+        <p:nvPr/>
+      </p:nvGrpSpPr>
+      <p:grpSpPr>
+        <a:xfrm>
+          <a:off x="0" y="0"/>
+          <a:ext cx="0" cy="0"/>
+          <a:chOff x="0" y="0"/>
+          <a:chExt cx="0" cy="0"/>
+        </a:xfrm>
+      </p:grpSpPr>
       <p:graphicFrame>
         <p:nvGraphicFramePr>
           <p:cNvPr id="4" name="Table 4">
@@ -6452,7 +6917,7 @@
 </p:sld>
 </file>
 
-<file path=ppt/slides/slide4.xml><?xml version="1.0" encoding="utf-8"?>
+<file path=ppt/slides/slide5.xml><?xml version="1.0" encoding="utf-8"?>
 <p:sld xmlns:a="http://schemas.openxmlformats.org/drawingml/2006/main" xmlns:r="http://schemas.openxmlformats.org/officeDocument/2006/relationships" xmlns:p="http://schemas.openxmlformats.org/presentationml/2006/main">
   <p:cSld>
     <p:spTree>
@@ -6802,6 +7267,804 @@
 </p:sld>
 </file>
 
+<file path=ppt/slides/slide6.xml><?xml version="1.0" encoding="utf-8"?>
+<p:sld xmlns:a="http://schemas.openxmlformats.org/drawingml/2006/main" xmlns:r="http://schemas.openxmlformats.org/officeDocument/2006/relationships" xmlns:p="http://schemas.openxmlformats.org/presentationml/2006/main">
+  <p:cSld>
+    <p:spTree>
+      <p:nvGrpSpPr>
+        <p:cNvPr id="1" name=""/>
+        <p:cNvGrpSpPr/>
+        <p:nvPr/>
+      </p:nvGrpSpPr>
+      <p:grpSpPr>
+        <a:xfrm>
+          <a:off x="0" y="0"/>
+          <a:ext cx="0" cy="0"/>
+          <a:chOff x="0" y="0"/>
+          <a:chExt cx="0" cy="0"/>
+        </a:xfrm>
+      </p:grpSpPr>
+      <p:sp>
+        <p:nvSpPr>
+          <p:cNvPr id="2" name="Title 1">
+            <a:extLst>
+              <a:ext uri="{FF2B5EF4-FFF2-40B4-BE49-F238E27FC236}">
+                <a16:creationId xmlns:a16="http://schemas.microsoft.com/office/drawing/2014/main" id="{27536085-1D39-DA7F-B752-846EBB5108CD}"/>
+              </a:ext>
+            </a:extLst>
+          </p:cNvPr>
+          <p:cNvSpPr>
+            <a:spLocks noGrp="1"/>
+          </p:cNvSpPr>
+          <p:nvPr>
+            <p:ph type="title"/>
+          </p:nvPr>
+        </p:nvSpPr>
+        <p:spPr/>
+        <p:txBody>
+          <a:bodyPr/>
+          <a:lstStyle/>
+          <a:p>
+            <a:r>
+              <a:rPr lang="en-US" b="1" dirty="0">
+                <a:solidFill>
+                  <a:srgbClr val="00B050"/>
+                </a:solidFill>
+              </a:rPr>
+              <a:t>ML Model deployment</a:t>
+            </a:r>
+            <a:endParaRPr lang="en-IN" dirty="0"/>
+          </a:p>
+        </p:txBody>
+      </p:sp>
+      <p:sp>
+        <p:nvSpPr>
+          <p:cNvPr id="5" name="Rectangle 4">
+            <a:extLst>
+              <a:ext uri="{FF2B5EF4-FFF2-40B4-BE49-F238E27FC236}">
+                <a16:creationId xmlns:a16="http://schemas.microsoft.com/office/drawing/2014/main" id="{987B8FDC-AFCB-3C5F-EFB4-488E4F3EEFF2}"/>
+              </a:ext>
+            </a:extLst>
+          </p:cNvPr>
+          <p:cNvSpPr/>
+          <p:nvPr/>
+        </p:nvSpPr>
+        <p:spPr>
+          <a:xfrm>
+            <a:off x="318539" y="1463996"/>
+            <a:ext cx="9475910" cy="3486946"/>
+          </a:xfrm>
+          <a:prstGeom prst="rect">
+            <a:avLst/>
+          </a:prstGeom>
+        </p:spPr>
+        <p:style>
+          <a:lnRef idx="2">
+            <a:schemeClr val="accent1">
+              <a:shade val="50000"/>
+            </a:schemeClr>
+          </a:lnRef>
+          <a:fillRef idx="1">
+            <a:schemeClr val="accent1"/>
+          </a:fillRef>
+          <a:effectRef idx="0">
+            <a:schemeClr val="accent1"/>
+          </a:effectRef>
+          <a:fontRef idx="minor">
+            <a:schemeClr val="lt1"/>
+          </a:fontRef>
+        </p:style>
+        <p:txBody>
+          <a:bodyPr rtlCol="0" anchor="ctr"/>
+          <a:lstStyle/>
+          <a:p>
+            <a:endParaRPr lang="en-US" sz="2800" b="1" dirty="0"/>
+          </a:p>
+          <a:p>
+            <a:endParaRPr lang="en-US" sz="2800" b="1" dirty="0"/>
+          </a:p>
+          <a:p>
+            <a:r>
+              <a:rPr lang="en-US" sz="2800" b="1" dirty="0"/>
+              <a:t>AWS</a:t>
+            </a:r>
+            <a:endParaRPr lang="en-IN" b="1" dirty="0"/>
+          </a:p>
+        </p:txBody>
+      </p:sp>
+      <p:sp>
+        <p:nvSpPr>
+          <p:cNvPr id="7" name="Rectangle 6">
+            <a:extLst>
+              <a:ext uri="{FF2B5EF4-FFF2-40B4-BE49-F238E27FC236}">
+                <a16:creationId xmlns:a16="http://schemas.microsoft.com/office/drawing/2014/main" id="{ED5D2504-8BDA-CE21-A723-C113871A4C17}"/>
+              </a:ext>
+            </a:extLst>
+          </p:cNvPr>
+          <p:cNvSpPr/>
+          <p:nvPr/>
+        </p:nvSpPr>
+        <p:spPr>
+          <a:xfrm>
+            <a:off x="2724360" y="1948991"/>
+            <a:ext cx="2092751" cy="1086439"/>
+          </a:xfrm>
+          <a:prstGeom prst="rect">
+            <a:avLst/>
+          </a:prstGeom>
+        </p:spPr>
+        <p:style>
+          <a:lnRef idx="2">
+            <a:schemeClr val="accent3">
+              <a:shade val="50000"/>
+            </a:schemeClr>
+          </a:lnRef>
+          <a:fillRef idx="1">
+            <a:schemeClr val="accent3"/>
+          </a:fillRef>
+          <a:effectRef idx="0">
+            <a:schemeClr val="accent3"/>
+          </a:effectRef>
+          <a:fontRef idx="minor">
+            <a:schemeClr val="lt1"/>
+          </a:fontRef>
+        </p:style>
+        <p:txBody>
+          <a:bodyPr rtlCol="0" anchor="ctr"/>
+          <a:lstStyle/>
+          <a:p>
+            <a:pPr algn="ctr"/>
+            <a:r>
+              <a:rPr lang="en-US" dirty="0"/>
+              <a:t>AWS bucket</a:t>
+            </a:r>
+          </a:p>
+          <a:p>
+            <a:pPr algn="ctr"/>
+            <a:r>
+              <a:rPr lang="en-US" dirty="0"/>
+              <a:t>(Contains dataset)</a:t>
+            </a:r>
+            <a:endParaRPr lang="en-IN" dirty="0"/>
+          </a:p>
+        </p:txBody>
+      </p:sp>
+      <p:sp>
+        <p:nvSpPr>
+          <p:cNvPr id="9" name="Rectangle 8">
+            <a:extLst>
+              <a:ext uri="{FF2B5EF4-FFF2-40B4-BE49-F238E27FC236}">
+                <a16:creationId xmlns:a16="http://schemas.microsoft.com/office/drawing/2014/main" id="{6782F2F8-35A4-4E58-047D-91AE84D234F2}"/>
+              </a:ext>
+            </a:extLst>
+          </p:cNvPr>
+          <p:cNvSpPr/>
+          <p:nvPr/>
+        </p:nvSpPr>
+        <p:spPr>
+          <a:xfrm>
+            <a:off x="2724359" y="3379508"/>
+            <a:ext cx="2092751" cy="1086439"/>
+          </a:xfrm>
+          <a:prstGeom prst="rect">
+            <a:avLst/>
+          </a:prstGeom>
+        </p:spPr>
+        <p:style>
+          <a:lnRef idx="2">
+            <a:schemeClr val="accent3">
+              <a:shade val="50000"/>
+            </a:schemeClr>
+          </a:lnRef>
+          <a:fillRef idx="1">
+            <a:schemeClr val="accent3"/>
+          </a:fillRef>
+          <a:effectRef idx="0">
+            <a:schemeClr val="accent3"/>
+          </a:effectRef>
+          <a:fontRef idx="minor">
+            <a:schemeClr val="lt1"/>
+          </a:fontRef>
+        </p:style>
+        <p:txBody>
+          <a:bodyPr rtlCol="0" anchor="ctr"/>
+          <a:lstStyle/>
+          <a:p>
+            <a:pPr algn="ctr"/>
+            <a:r>
+              <a:rPr lang="en-US" dirty="0" err="1"/>
+              <a:t>XGBoost</a:t>
+            </a:r>
+            <a:r>
+              <a:rPr lang="en-US" dirty="0"/>
+              <a:t> container</a:t>
+            </a:r>
+          </a:p>
+          <a:p>
+            <a:pPr algn="ctr"/>
+            <a:r>
+              <a:rPr lang="en-US" dirty="0"/>
+              <a:t>(Contains model)</a:t>
+            </a:r>
+            <a:endParaRPr lang="en-IN" dirty="0"/>
+          </a:p>
+        </p:txBody>
+      </p:sp>
+      <p:cxnSp>
+        <p:nvCxnSpPr>
+          <p:cNvPr id="15" name="Straight Arrow Connector 14">
+            <a:extLst>
+              <a:ext uri="{FF2B5EF4-FFF2-40B4-BE49-F238E27FC236}">
+                <a16:creationId xmlns:a16="http://schemas.microsoft.com/office/drawing/2014/main" id="{B6AC06E1-8ADA-6D58-2EB9-C64AA9B9D1CB}"/>
+              </a:ext>
+            </a:extLst>
+          </p:cNvPr>
+          <p:cNvCxnSpPr>
+            <a:stCxn id="7" idx="2"/>
+            <a:endCxn id="9" idx="0"/>
+          </p:cNvCxnSpPr>
+          <p:nvPr/>
+        </p:nvCxnSpPr>
+        <p:spPr>
+          <a:xfrm flipH="1">
+            <a:off x="3770735" y="3035430"/>
+            <a:ext cx="1" cy="344078"/>
+          </a:xfrm>
+          <a:prstGeom prst="straightConnector1">
+            <a:avLst/>
+          </a:prstGeom>
+          <a:ln>
+            <a:tailEnd type="triangle"/>
+          </a:ln>
+        </p:spPr>
+        <p:style>
+          <a:lnRef idx="1">
+            <a:schemeClr val="accent5"/>
+          </a:lnRef>
+          <a:fillRef idx="0">
+            <a:schemeClr val="accent5"/>
+          </a:fillRef>
+          <a:effectRef idx="0">
+            <a:schemeClr val="accent5"/>
+          </a:effectRef>
+          <a:fontRef idx="minor">
+            <a:schemeClr val="tx1"/>
+          </a:fontRef>
+        </p:style>
+      </p:cxnSp>
+      <p:sp>
+        <p:nvSpPr>
+          <p:cNvPr id="17" name="Rectangle 16">
+            <a:extLst>
+              <a:ext uri="{FF2B5EF4-FFF2-40B4-BE49-F238E27FC236}">
+                <a16:creationId xmlns:a16="http://schemas.microsoft.com/office/drawing/2014/main" id="{4BB7A562-4B8F-19C6-F2F4-42AED8119AE0}"/>
+              </a:ext>
+            </a:extLst>
+          </p:cNvPr>
+          <p:cNvSpPr/>
+          <p:nvPr/>
+        </p:nvSpPr>
+        <p:spPr>
+          <a:xfrm>
+            <a:off x="6292405" y="2125743"/>
+            <a:ext cx="2092751" cy="645737"/>
+          </a:xfrm>
+          <a:prstGeom prst="rect">
+            <a:avLst/>
+          </a:prstGeom>
+        </p:spPr>
+        <p:style>
+          <a:lnRef idx="2">
+            <a:schemeClr val="accent3">
+              <a:shade val="50000"/>
+            </a:schemeClr>
+          </a:lnRef>
+          <a:fillRef idx="1">
+            <a:schemeClr val="accent3"/>
+          </a:fillRef>
+          <a:effectRef idx="0">
+            <a:schemeClr val="accent3"/>
+          </a:effectRef>
+          <a:fontRef idx="minor">
+            <a:schemeClr val="lt1"/>
+          </a:fontRef>
+        </p:style>
+        <p:txBody>
+          <a:bodyPr rtlCol="0" anchor="ctr"/>
+          <a:lstStyle/>
+          <a:p>
+            <a:pPr algn="ctr"/>
+            <a:r>
+              <a:rPr lang="en-US" dirty="0"/>
+              <a:t>Model Endpoint</a:t>
+            </a:r>
+            <a:endParaRPr lang="en-IN" dirty="0"/>
+          </a:p>
+        </p:txBody>
+      </p:sp>
+      <p:cxnSp>
+        <p:nvCxnSpPr>
+          <p:cNvPr id="20" name="Straight Arrow Connector 19">
+            <a:extLst>
+              <a:ext uri="{FF2B5EF4-FFF2-40B4-BE49-F238E27FC236}">
+                <a16:creationId xmlns:a16="http://schemas.microsoft.com/office/drawing/2014/main" id="{758BACE2-49EF-780A-A97F-F9A6B2A9CDE2}"/>
+              </a:ext>
+            </a:extLst>
+          </p:cNvPr>
+          <p:cNvCxnSpPr>
+            <a:cxnSpLocks/>
+            <a:stCxn id="9" idx="3"/>
+            <a:endCxn id="17" idx="1"/>
+          </p:cNvCxnSpPr>
+          <p:nvPr/>
+        </p:nvCxnSpPr>
+        <p:spPr>
+          <a:xfrm flipV="1">
+            <a:off x="4817110" y="2448612"/>
+            <a:ext cx="1475295" cy="1474116"/>
+          </a:xfrm>
+          <a:prstGeom prst="straightConnector1">
+            <a:avLst/>
+          </a:prstGeom>
+          <a:ln>
+            <a:tailEnd type="triangle"/>
+          </a:ln>
+        </p:spPr>
+        <p:style>
+          <a:lnRef idx="1">
+            <a:schemeClr val="accent5"/>
+          </a:lnRef>
+          <a:fillRef idx="0">
+            <a:schemeClr val="accent5"/>
+          </a:fillRef>
+          <a:effectRef idx="0">
+            <a:schemeClr val="accent5"/>
+          </a:effectRef>
+          <a:fontRef idx="minor">
+            <a:schemeClr val="tx1"/>
+          </a:fontRef>
+        </p:style>
+      </p:cxnSp>
+      <p:sp>
+        <p:nvSpPr>
+          <p:cNvPr id="21" name="TextBox 20">
+            <a:extLst>
+              <a:ext uri="{FF2B5EF4-FFF2-40B4-BE49-F238E27FC236}">
+                <a16:creationId xmlns:a16="http://schemas.microsoft.com/office/drawing/2014/main" id="{BE58D7CB-AB2A-B359-95CA-F0F08AE7069F}"/>
+              </a:ext>
+            </a:extLst>
+          </p:cNvPr>
+          <p:cNvSpPr txBox="1"/>
+          <p:nvPr/>
+        </p:nvSpPr>
+        <p:spPr>
+          <a:xfrm>
+            <a:off x="4824072" y="3086435"/>
+            <a:ext cx="1654620" cy="369332"/>
+          </a:xfrm>
+          <a:prstGeom prst="rect">
+            <a:avLst/>
+          </a:prstGeom>
+          <a:noFill/>
+        </p:spPr>
+        <p:txBody>
+          <a:bodyPr wrap="none" rtlCol="0">
+            <a:spAutoFit/>
+          </a:bodyPr>
+          <a:lstStyle/>
+          <a:p>
+            <a:r>
+              <a:rPr lang="en-US" dirty="0"/>
+              <a:t>After  training</a:t>
+            </a:r>
+            <a:endParaRPr lang="en-IN" dirty="0"/>
+          </a:p>
+        </p:txBody>
+      </p:sp>
+      <p:cxnSp>
+        <p:nvCxnSpPr>
+          <p:cNvPr id="23" name="Straight Arrow Connector 22">
+            <a:extLst>
+              <a:ext uri="{FF2B5EF4-FFF2-40B4-BE49-F238E27FC236}">
+                <a16:creationId xmlns:a16="http://schemas.microsoft.com/office/drawing/2014/main" id="{C14D9E80-E3F3-305B-BA48-B04D5C38A8D8}"/>
+              </a:ext>
+            </a:extLst>
+          </p:cNvPr>
+          <p:cNvCxnSpPr>
+            <a:cxnSpLocks/>
+            <a:stCxn id="17" idx="2"/>
+            <a:endCxn id="24" idx="0"/>
+          </p:cNvCxnSpPr>
+          <p:nvPr/>
+        </p:nvCxnSpPr>
+        <p:spPr>
+          <a:xfrm>
+            <a:off x="7338781" y="2771480"/>
+            <a:ext cx="0" cy="1151247"/>
+          </a:xfrm>
+          <a:prstGeom prst="straightConnector1">
+            <a:avLst/>
+          </a:prstGeom>
+          <a:ln>
+            <a:tailEnd type="triangle"/>
+          </a:ln>
+        </p:spPr>
+        <p:style>
+          <a:lnRef idx="1">
+            <a:schemeClr val="accent5"/>
+          </a:lnRef>
+          <a:fillRef idx="0">
+            <a:schemeClr val="accent5"/>
+          </a:fillRef>
+          <a:effectRef idx="0">
+            <a:schemeClr val="accent5"/>
+          </a:effectRef>
+          <a:fontRef idx="minor">
+            <a:schemeClr val="tx1"/>
+          </a:fontRef>
+        </p:style>
+      </p:cxnSp>
+      <p:sp>
+        <p:nvSpPr>
+          <p:cNvPr id="24" name="Rectangle 23">
+            <a:extLst>
+              <a:ext uri="{FF2B5EF4-FFF2-40B4-BE49-F238E27FC236}">
+                <a16:creationId xmlns:a16="http://schemas.microsoft.com/office/drawing/2014/main" id="{E103C6E0-D4A9-834A-3A30-21366D240F48}"/>
+              </a:ext>
+            </a:extLst>
+          </p:cNvPr>
+          <p:cNvSpPr/>
+          <p:nvPr/>
+        </p:nvSpPr>
+        <p:spPr>
+          <a:xfrm>
+            <a:off x="6504509" y="3922727"/>
+            <a:ext cx="1668544" cy="543220"/>
+          </a:xfrm>
+          <a:prstGeom prst="rect">
+            <a:avLst/>
+          </a:prstGeom>
+        </p:spPr>
+        <p:style>
+          <a:lnRef idx="2">
+            <a:schemeClr val="accent3">
+              <a:shade val="50000"/>
+            </a:schemeClr>
+          </a:lnRef>
+          <a:fillRef idx="1">
+            <a:schemeClr val="accent3"/>
+          </a:fillRef>
+          <a:effectRef idx="0">
+            <a:schemeClr val="accent3"/>
+          </a:effectRef>
+          <a:fontRef idx="minor">
+            <a:schemeClr val="lt1"/>
+          </a:fontRef>
+        </p:style>
+        <p:txBody>
+          <a:bodyPr rtlCol="0" anchor="ctr"/>
+          <a:lstStyle/>
+          <a:p>
+            <a:pPr algn="ctr"/>
+            <a:r>
+              <a:rPr lang="en-US" dirty="0"/>
+              <a:t>Deployment link</a:t>
+            </a:r>
+            <a:endParaRPr lang="en-IN" dirty="0"/>
+          </a:p>
+        </p:txBody>
+      </p:sp>
+      <p:sp>
+        <p:nvSpPr>
+          <p:cNvPr id="30" name="TextBox 29">
+            <a:extLst>
+              <a:ext uri="{FF2B5EF4-FFF2-40B4-BE49-F238E27FC236}">
+                <a16:creationId xmlns:a16="http://schemas.microsoft.com/office/drawing/2014/main" id="{3C488A95-733E-EB80-24EB-0B7ECBCEA791}"/>
+              </a:ext>
+            </a:extLst>
+          </p:cNvPr>
+          <p:cNvSpPr txBox="1"/>
+          <p:nvPr/>
+        </p:nvSpPr>
+        <p:spPr>
+          <a:xfrm>
+            <a:off x="7338715" y="3185670"/>
+            <a:ext cx="2092881" cy="369332"/>
+          </a:xfrm>
+          <a:prstGeom prst="rect">
+            <a:avLst/>
+          </a:prstGeom>
+          <a:noFill/>
+        </p:spPr>
+        <p:txBody>
+          <a:bodyPr wrap="none" rtlCol="0">
+            <a:spAutoFit/>
+          </a:bodyPr>
+          <a:lstStyle/>
+          <a:p>
+            <a:r>
+              <a:rPr lang="en-US" dirty="0"/>
+              <a:t>Using AWS Lambda</a:t>
+            </a:r>
+            <a:endParaRPr lang="en-IN" dirty="0"/>
+          </a:p>
+        </p:txBody>
+      </p:sp>
+      <p:cxnSp>
+        <p:nvCxnSpPr>
+          <p:cNvPr id="34" name="Straight Arrow Connector 33">
+            <a:extLst>
+              <a:ext uri="{FF2B5EF4-FFF2-40B4-BE49-F238E27FC236}">
+                <a16:creationId xmlns:a16="http://schemas.microsoft.com/office/drawing/2014/main" id="{3AB74D32-C70D-6A58-AB64-C675E6F52530}"/>
+              </a:ext>
+            </a:extLst>
+          </p:cNvPr>
+          <p:cNvCxnSpPr>
+            <a:cxnSpLocks/>
+            <a:endCxn id="7" idx="1"/>
+          </p:cNvCxnSpPr>
+          <p:nvPr/>
+        </p:nvCxnSpPr>
+        <p:spPr>
+          <a:xfrm>
+            <a:off x="1630848" y="2492211"/>
+            <a:ext cx="1093512" cy="0"/>
+          </a:xfrm>
+          <a:prstGeom prst="straightConnector1">
+            <a:avLst/>
+          </a:prstGeom>
+          <a:ln>
+            <a:tailEnd type="triangle"/>
+          </a:ln>
+        </p:spPr>
+        <p:style>
+          <a:lnRef idx="1">
+            <a:schemeClr val="accent5"/>
+          </a:lnRef>
+          <a:fillRef idx="0">
+            <a:schemeClr val="accent5"/>
+          </a:fillRef>
+          <a:effectRef idx="0">
+            <a:schemeClr val="accent5"/>
+          </a:effectRef>
+          <a:fontRef idx="minor">
+            <a:schemeClr val="tx1"/>
+          </a:fontRef>
+        </p:style>
+      </p:cxnSp>
+      <p:sp>
+        <p:nvSpPr>
+          <p:cNvPr id="36" name="TextBox 35">
+            <a:extLst>
+              <a:ext uri="{FF2B5EF4-FFF2-40B4-BE49-F238E27FC236}">
+                <a16:creationId xmlns:a16="http://schemas.microsoft.com/office/drawing/2014/main" id="{3A9E64D7-ABE2-87AB-B9F1-88DA98CA50D3}"/>
+              </a:ext>
+            </a:extLst>
+          </p:cNvPr>
+          <p:cNvSpPr txBox="1"/>
+          <p:nvPr/>
+        </p:nvSpPr>
+        <p:spPr>
+          <a:xfrm>
+            <a:off x="358625" y="1882234"/>
+            <a:ext cx="2597081" cy="1200329"/>
+          </a:xfrm>
+          <a:prstGeom prst="rect">
+            <a:avLst/>
+          </a:prstGeom>
+          <a:noFill/>
+        </p:spPr>
+        <p:txBody>
+          <a:bodyPr wrap="square" rtlCol="0">
+            <a:spAutoFit/>
+          </a:bodyPr>
+          <a:lstStyle/>
+          <a:p>
+            <a:r>
+              <a:rPr lang="en-US" dirty="0"/>
+              <a:t>On adding new data</a:t>
+            </a:r>
+          </a:p>
+          <a:p>
+            <a:r>
+              <a:rPr lang="en-US" dirty="0"/>
+              <a:t>the container will</a:t>
+            </a:r>
+          </a:p>
+          <a:p>
+            <a:r>
+              <a:rPr lang="en-US" dirty="0"/>
+              <a:t>retrain the model</a:t>
+            </a:r>
+          </a:p>
+          <a:p>
+            <a:r>
+              <a:rPr lang="en-US" dirty="0"/>
+              <a:t>and update endpoint.</a:t>
+            </a:r>
+          </a:p>
+        </p:txBody>
+      </p:sp>
+      <p:cxnSp>
+        <p:nvCxnSpPr>
+          <p:cNvPr id="38" name="Straight Arrow Connector 37">
+            <a:extLst>
+              <a:ext uri="{FF2B5EF4-FFF2-40B4-BE49-F238E27FC236}">
+                <a16:creationId xmlns:a16="http://schemas.microsoft.com/office/drawing/2014/main" id="{EDA243DB-699D-8B2F-1D6B-B2CC5C5987B1}"/>
+              </a:ext>
+            </a:extLst>
+          </p:cNvPr>
+          <p:cNvCxnSpPr>
+            <a:cxnSpLocks/>
+            <a:endCxn id="9" idx="2"/>
+          </p:cNvCxnSpPr>
+          <p:nvPr/>
+        </p:nvCxnSpPr>
+        <p:spPr>
+          <a:xfrm flipV="1">
+            <a:off x="3770734" y="4465947"/>
+            <a:ext cx="1" cy="1265550"/>
+          </a:xfrm>
+          <a:prstGeom prst="straightConnector1">
+            <a:avLst/>
+          </a:prstGeom>
+          <a:ln>
+            <a:tailEnd type="triangle"/>
+          </a:ln>
+        </p:spPr>
+        <p:style>
+          <a:lnRef idx="1">
+            <a:schemeClr val="accent5"/>
+          </a:lnRef>
+          <a:fillRef idx="0">
+            <a:schemeClr val="accent5"/>
+          </a:fillRef>
+          <a:effectRef idx="0">
+            <a:schemeClr val="accent5"/>
+          </a:effectRef>
+          <a:fontRef idx="minor">
+            <a:schemeClr val="tx1"/>
+          </a:fontRef>
+        </p:style>
+      </p:cxnSp>
+      <p:sp>
+        <p:nvSpPr>
+          <p:cNvPr id="40" name="TextBox 39">
+            <a:extLst>
+              <a:ext uri="{FF2B5EF4-FFF2-40B4-BE49-F238E27FC236}">
+                <a16:creationId xmlns:a16="http://schemas.microsoft.com/office/drawing/2014/main" id="{0BE07842-4028-8D7B-C5A6-A478018F9DBE}"/>
+              </a:ext>
+            </a:extLst>
+          </p:cNvPr>
+          <p:cNvSpPr txBox="1"/>
+          <p:nvPr/>
+        </p:nvSpPr>
+        <p:spPr>
+          <a:xfrm>
+            <a:off x="3766093" y="4953817"/>
+            <a:ext cx="3055645" cy="923330"/>
+          </a:xfrm>
+          <a:prstGeom prst="rect">
+            <a:avLst/>
+          </a:prstGeom>
+          <a:noFill/>
+        </p:spPr>
+        <p:txBody>
+          <a:bodyPr wrap="none" rtlCol="0">
+            <a:spAutoFit/>
+          </a:bodyPr>
+          <a:lstStyle/>
+          <a:p>
+            <a:r>
+              <a:rPr lang="en-US" dirty="0"/>
+              <a:t>On optimizing parameters</a:t>
+            </a:r>
+          </a:p>
+          <a:p>
+            <a:r>
+              <a:rPr lang="en-US" dirty="0"/>
+              <a:t>the model endpoint will be </a:t>
+            </a:r>
+          </a:p>
+          <a:p>
+            <a:r>
+              <a:rPr lang="en-US" dirty="0"/>
+              <a:t>updated </a:t>
+            </a:r>
+          </a:p>
+        </p:txBody>
+      </p:sp>
+      <p:sp>
+        <p:nvSpPr>
+          <p:cNvPr id="41" name="TextBox 40">
+            <a:extLst>
+              <a:ext uri="{FF2B5EF4-FFF2-40B4-BE49-F238E27FC236}">
+                <a16:creationId xmlns:a16="http://schemas.microsoft.com/office/drawing/2014/main" id="{FCE9C907-243C-A0DF-0694-14BDE970A30E}"/>
+              </a:ext>
+            </a:extLst>
+          </p:cNvPr>
+          <p:cNvSpPr txBox="1"/>
+          <p:nvPr/>
+        </p:nvSpPr>
+        <p:spPr>
+          <a:xfrm>
+            <a:off x="2806020" y="2997722"/>
+            <a:ext cx="1624579" cy="369332"/>
+          </a:xfrm>
+          <a:prstGeom prst="rect">
+            <a:avLst/>
+          </a:prstGeom>
+          <a:noFill/>
+        </p:spPr>
+        <p:txBody>
+          <a:bodyPr wrap="square" rtlCol="0">
+            <a:spAutoFit/>
+          </a:bodyPr>
+          <a:lstStyle/>
+          <a:p>
+            <a:r>
+              <a:rPr lang="en-US" dirty="0"/>
+              <a:t>Provides data</a:t>
+            </a:r>
+            <a:endParaRPr lang="en-IN" dirty="0"/>
+          </a:p>
+        </p:txBody>
+      </p:sp>
+      <p:sp>
+        <p:nvSpPr>
+          <p:cNvPr id="42" name="TextBox 41">
+            <a:extLst>
+              <a:ext uri="{FF2B5EF4-FFF2-40B4-BE49-F238E27FC236}">
+                <a16:creationId xmlns:a16="http://schemas.microsoft.com/office/drawing/2014/main" id="{F6E1DECD-DFDA-057A-BDEF-3DFA9E46D774}"/>
+              </a:ext>
+            </a:extLst>
+          </p:cNvPr>
+          <p:cNvSpPr txBox="1"/>
+          <p:nvPr/>
+        </p:nvSpPr>
+        <p:spPr>
+          <a:xfrm>
+            <a:off x="405858" y="5917523"/>
+            <a:ext cx="8455776" cy="646331"/>
+          </a:xfrm>
+          <a:prstGeom prst="rect">
+            <a:avLst/>
+          </a:prstGeom>
+          <a:noFill/>
+        </p:spPr>
+        <p:txBody>
+          <a:bodyPr wrap="none" rtlCol="0">
+            <a:spAutoFit/>
+          </a:bodyPr>
+          <a:lstStyle/>
+          <a:p>
+            <a:r>
+              <a:rPr lang="en-US" dirty="0"/>
+              <a:t>The above cycle provides automated workflow, where you can add new training</a:t>
+            </a:r>
+          </a:p>
+          <a:p>
+            <a:r>
+              <a:rPr lang="en-US" dirty="0"/>
+              <a:t>data or optimize model parameter without disturbing deployment.</a:t>
+            </a:r>
+            <a:endParaRPr lang="en-IN" dirty="0"/>
+          </a:p>
+        </p:txBody>
+      </p:sp>
+    </p:spTree>
+    <p:extLst>
+      <p:ext uri="{BB962C8B-B14F-4D97-AF65-F5344CB8AC3E}">
+        <p14:creationId xmlns:p14="http://schemas.microsoft.com/office/powerpoint/2010/main" val="2172075318"/>
+      </p:ext>
+    </p:extLst>
+  </p:cSld>
+  <p:clrMapOvr>
+    <a:masterClrMapping/>
+  </p:clrMapOvr>
+</p:sld>
+</file>
+
 <file path=ppt/theme/theme1.xml><?xml version="1.0" encoding="utf-8"?>
 <a:theme xmlns:a="http://schemas.openxmlformats.org/drawingml/2006/main" name="Facet">
   <a:themeElements>

</xml_diff>